<commit_message>
subindo atualização do ppt com diagrama de software docker
</commit_message>
<xml_diff>
--- a/Sistemas Operacionais/Apresentação Docker.pptx
+++ b/Sistemas Operacionais/Apresentação Docker.pptx
@@ -119,6 +119,11 @@
       </a:defRPr>
     </a:lvl9pPr>
   </p:defaultTextStyle>
+  <p:extLst>
+    <p:ext uri="{EFAFB233-063F-42B5-8137-9DF3F51BA10A}">
+      <p15:sldGuideLst xmlns:p15="http://schemas.microsoft.com/office/powerpoint/2012/main"/>
+    </p:ext>
+  </p:extLst>
 </p:presentation>
 </file>
 
@@ -325,7 +330,7 @@
           <a:p>
             <a:fld id="{B235B980-33A9-44FD-B853-FC0F9AC629C3}" type="slidenum">
               <a:rPr lang="pt-BR" smtClean="0"/>
-              <a:t>‹#›</a:t>
+              <a:t>‹nº›</a:t>
             </a:fld>
             <a:endParaRPr lang="pt-BR"/>
           </a:p>
@@ -525,7 +530,7 @@
           <a:p>
             <a:fld id="{B235B980-33A9-44FD-B853-FC0F9AC629C3}" type="slidenum">
               <a:rPr lang="pt-BR" smtClean="0"/>
-              <a:t>‹#›</a:t>
+              <a:t>‹nº›</a:t>
             </a:fld>
             <a:endParaRPr lang="pt-BR"/>
           </a:p>
@@ -735,7 +740,7 @@
           <a:p>
             <a:fld id="{B235B980-33A9-44FD-B853-FC0F9AC629C3}" type="slidenum">
               <a:rPr lang="pt-BR" smtClean="0"/>
-              <a:t>‹#›</a:t>
+              <a:t>‹nº›</a:t>
             </a:fld>
             <a:endParaRPr lang="pt-BR"/>
           </a:p>
@@ -935,7 +940,7 @@
           <a:p>
             <a:fld id="{B235B980-33A9-44FD-B853-FC0F9AC629C3}" type="slidenum">
               <a:rPr lang="pt-BR" smtClean="0"/>
-              <a:t>‹#›</a:t>
+              <a:t>‹nº›</a:t>
             </a:fld>
             <a:endParaRPr lang="pt-BR"/>
           </a:p>
@@ -1211,7 +1216,7 @@
           <a:p>
             <a:fld id="{B235B980-33A9-44FD-B853-FC0F9AC629C3}" type="slidenum">
               <a:rPr lang="pt-BR" smtClean="0"/>
-              <a:t>‹#›</a:t>
+              <a:t>‹nº›</a:t>
             </a:fld>
             <a:endParaRPr lang="pt-BR"/>
           </a:p>
@@ -1479,7 +1484,7 @@
           <a:p>
             <a:fld id="{B235B980-33A9-44FD-B853-FC0F9AC629C3}" type="slidenum">
               <a:rPr lang="pt-BR" smtClean="0"/>
-              <a:t>‹#›</a:t>
+              <a:t>‹nº›</a:t>
             </a:fld>
             <a:endParaRPr lang="pt-BR"/>
           </a:p>
@@ -1894,7 +1899,7 @@
           <a:p>
             <a:fld id="{B235B980-33A9-44FD-B853-FC0F9AC629C3}" type="slidenum">
               <a:rPr lang="pt-BR" smtClean="0"/>
-              <a:t>‹#›</a:t>
+              <a:t>‹nº›</a:t>
             </a:fld>
             <a:endParaRPr lang="pt-BR"/>
           </a:p>
@@ -2036,7 +2041,7 @@
           <a:p>
             <a:fld id="{B235B980-33A9-44FD-B853-FC0F9AC629C3}" type="slidenum">
               <a:rPr lang="pt-BR" smtClean="0"/>
-              <a:t>‹#›</a:t>
+              <a:t>‹nº›</a:t>
             </a:fld>
             <a:endParaRPr lang="pt-BR"/>
           </a:p>
@@ -2149,7 +2154,7 @@
           <a:p>
             <a:fld id="{B235B980-33A9-44FD-B853-FC0F9AC629C3}" type="slidenum">
               <a:rPr lang="pt-BR" smtClean="0"/>
-              <a:t>‹#›</a:t>
+              <a:t>‹nº›</a:t>
             </a:fld>
             <a:endParaRPr lang="pt-BR"/>
           </a:p>
@@ -2462,7 +2467,7 @@
           <a:p>
             <a:fld id="{B235B980-33A9-44FD-B853-FC0F9AC629C3}" type="slidenum">
               <a:rPr lang="pt-BR" smtClean="0"/>
-              <a:t>‹#›</a:t>
+              <a:t>‹nº›</a:t>
             </a:fld>
             <a:endParaRPr lang="pt-BR"/>
           </a:p>
@@ -2751,7 +2756,7 @@
           <a:p>
             <a:fld id="{B235B980-33A9-44FD-B853-FC0F9AC629C3}" type="slidenum">
               <a:rPr lang="pt-BR" smtClean="0"/>
-              <a:t>‹#›</a:t>
+              <a:t>‹nº›</a:t>
             </a:fld>
             <a:endParaRPr lang="pt-BR"/>
           </a:p>
@@ -2774,9 +2779,12 @@
 <p:sldMaster xmlns:a="http://schemas.openxmlformats.org/drawingml/2006/main" xmlns:r="http://schemas.openxmlformats.org/officeDocument/2006/relationships" xmlns:p="http://schemas.openxmlformats.org/presentationml/2006/main">
   <p:cSld>
     <p:bg>
-      <p:bgRef idx="1001">
-        <a:schemeClr val="bg1"/>
-      </p:bgRef>
+      <p:bgPr>
+        <a:solidFill>
+          <a:srgbClr val="F5FEF2"/>
+        </a:solidFill>
+        <a:effectLst/>
+      </p:bgPr>
     </p:bg>
     <p:spTree>
       <p:nvGrpSpPr>
@@ -3030,7 +3038,7 @@
           <a:p>
             <a:fld id="{B235B980-33A9-44FD-B853-FC0F9AC629C3}" type="slidenum">
               <a:rPr lang="pt-BR" smtClean="0"/>
-              <a:t>‹#›</a:t>
+              <a:t>‹nº›</a:t>
             </a:fld>
             <a:endParaRPr lang="pt-BR"/>
           </a:p>
@@ -4763,10 +4771,242 @@
       </p:grpSpPr>
       <p:sp>
         <p:nvSpPr>
-          <p:cNvPr id="25" name="TextBox 24">
-            <a:extLst>
-              <a:ext uri="{FF2B5EF4-FFF2-40B4-BE49-F238E27FC236}">
-                <a16:creationId xmlns:a16="http://schemas.microsoft.com/office/drawing/2014/main" id="{F09FD380-66AD-4EB6-B0BD-082E14CD2081}"/>
+          <p:cNvPr id="3" name="Nuvem 2">
+            <a:extLst>
+              <a:ext uri="{FF2B5EF4-FFF2-40B4-BE49-F238E27FC236}">
+                <a16:creationId xmlns:a16="http://schemas.microsoft.com/office/drawing/2014/main" id="{8A064649-3BF1-47FA-B99E-0958B7A6DFDC}"/>
+              </a:ext>
+            </a:extLst>
+          </p:cNvPr>
+          <p:cNvSpPr/>
+          <p:nvPr/>
+        </p:nvSpPr>
+        <p:spPr>
+          <a:xfrm>
+            <a:off x="7481844" y="-1636721"/>
+            <a:ext cx="6594787" cy="4942845"/>
+          </a:xfrm>
+          <a:prstGeom prst="cloud">
+            <a:avLst/>
+          </a:prstGeom>
+          <a:noFill/>
+          <a:ln w="9525" cap="flat" cmpd="sng" algn="ctr">
+            <a:solidFill>
+              <a:schemeClr val="dk1"/>
+            </a:solidFill>
+            <a:prstDash val="solid"/>
+            <a:round/>
+            <a:headEnd type="none" w="med" len="med"/>
+            <a:tailEnd type="none" w="med" len="med"/>
+          </a:ln>
+          <a:effectLst>
+            <a:outerShdw blurRad="50800" dist="38100" dir="2700000" algn="tl" rotWithShape="0">
+              <a:prstClr val="black">
+                <a:alpha val="40000"/>
+              </a:prstClr>
+            </a:outerShdw>
+          </a:effectLst>
+        </p:spPr>
+        <p:style>
+          <a:lnRef idx="0">
+            <a:scrgbClr r="0" g="0" b="0"/>
+          </a:lnRef>
+          <a:fillRef idx="0">
+            <a:scrgbClr r="0" g="0" b="0"/>
+          </a:fillRef>
+          <a:effectRef idx="0">
+            <a:scrgbClr r="0" g="0" b="0"/>
+          </a:effectRef>
+          <a:fontRef idx="minor">
+            <a:schemeClr val="dk1"/>
+          </a:fontRef>
+        </p:style>
+        <p:txBody>
+          <a:bodyPr rtlCol="0" anchor="ctr"/>
+          <a:lstStyle/>
+          <a:p>
+            <a:pPr algn="ctr"/>
+            <a:endParaRPr lang="pt-BR"/>
+          </a:p>
+        </p:txBody>
+      </p:sp>
+      <p:sp>
+        <p:nvSpPr>
+          <p:cNvPr id="4" name="Nuvem 3">
+            <a:extLst>
+              <a:ext uri="{FF2B5EF4-FFF2-40B4-BE49-F238E27FC236}">
+                <a16:creationId xmlns:a16="http://schemas.microsoft.com/office/drawing/2014/main" id="{AC6B9C91-FC57-4B28-9FB4-72E7CECF6997}"/>
+              </a:ext>
+            </a:extLst>
+          </p:cNvPr>
+          <p:cNvSpPr/>
+          <p:nvPr/>
+        </p:nvSpPr>
+        <p:spPr>
+          <a:xfrm>
+            <a:off x="-5543550" y="-1047749"/>
+            <a:ext cx="12616271" cy="8797428"/>
+          </a:xfrm>
+          <a:prstGeom prst="cloud">
+            <a:avLst/>
+          </a:prstGeom>
+          <a:noFill/>
+          <a:ln w="9525" cap="flat" cmpd="sng" algn="ctr">
+            <a:solidFill>
+              <a:schemeClr val="dk1"/>
+            </a:solidFill>
+            <a:prstDash val="solid"/>
+            <a:round/>
+            <a:headEnd type="none" w="med" len="med"/>
+            <a:tailEnd type="none" w="med" len="med"/>
+          </a:ln>
+          <a:effectLst>
+            <a:outerShdw blurRad="50800" dist="38100" dir="2700000" algn="tl" rotWithShape="0">
+              <a:prstClr val="black">
+                <a:alpha val="40000"/>
+              </a:prstClr>
+            </a:outerShdw>
+          </a:effectLst>
+        </p:spPr>
+        <p:style>
+          <a:lnRef idx="0">
+            <a:scrgbClr r="0" g="0" b="0"/>
+          </a:lnRef>
+          <a:fillRef idx="0">
+            <a:scrgbClr r="0" g="0" b="0"/>
+          </a:fillRef>
+          <a:effectRef idx="0">
+            <a:scrgbClr r="0" g="0" b="0"/>
+          </a:effectRef>
+          <a:fontRef idx="minor">
+            <a:schemeClr val="dk1"/>
+          </a:fontRef>
+        </p:style>
+        <p:txBody>
+          <a:bodyPr rtlCol="0" anchor="ctr"/>
+          <a:lstStyle/>
+          <a:p>
+            <a:pPr algn="ctr"/>
+            <a:endParaRPr lang="pt-BR" dirty="0"/>
+          </a:p>
+        </p:txBody>
+      </p:sp>
+      <p:sp>
+        <p:nvSpPr>
+          <p:cNvPr id="5" name="Retângulo: Cantos Arredondados 4">
+            <a:extLst>
+              <a:ext uri="{FF2B5EF4-FFF2-40B4-BE49-F238E27FC236}">
+                <a16:creationId xmlns:a16="http://schemas.microsoft.com/office/drawing/2014/main" id="{C1434881-D633-4C67-B8E2-2BA9B51E58D0}"/>
+              </a:ext>
+            </a:extLst>
+          </p:cNvPr>
+          <p:cNvSpPr/>
+          <p:nvPr/>
+        </p:nvSpPr>
+        <p:spPr>
+          <a:xfrm>
+            <a:off x="233958" y="2129246"/>
+            <a:ext cx="3593460" cy="3151888"/>
+          </a:xfrm>
+          <a:prstGeom prst="roundRect">
+            <a:avLst>
+              <a:gd name="adj" fmla="val 0"/>
+            </a:avLst>
+          </a:prstGeom>
+          <a:noFill/>
+          <a:ln w="9525" cap="flat" cmpd="sng" algn="ctr">
+            <a:solidFill>
+              <a:schemeClr val="dk1"/>
+            </a:solidFill>
+            <a:prstDash val="solid"/>
+            <a:round/>
+            <a:headEnd type="none" w="med" len="med"/>
+            <a:tailEnd type="none" w="med" len="med"/>
+          </a:ln>
+          <a:effectLst>
+            <a:outerShdw blurRad="50800" dist="38100" dir="2700000" algn="tl" rotWithShape="0">
+              <a:prstClr val="black">
+                <a:alpha val="40000"/>
+              </a:prstClr>
+            </a:outerShdw>
+          </a:effectLst>
+        </p:spPr>
+        <p:style>
+          <a:lnRef idx="0">
+            <a:scrgbClr r="0" g="0" b="0"/>
+          </a:lnRef>
+          <a:fillRef idx="0">
+            <a:scrgbClr r="0" g="0" b="0"/>
+          </a:fillRef>
+          <a:effectRef idx="0">
+            <a:scrgbClr r="0" g="0" b="0"/>
+          </a:effectRef>
+          <a:fontRef idx="minor">
+            <a:schemeClr val="dk1"/>
+          </a:fontRef>
+        </p:style>
+        <p:txBody>
+          <a:bodyPr rtlCol="0" anchor="ctr"/>
+          <a:lstStyle/>
+          <a:p>
+            <a:pPr algn="ctr"/>
+            <a:endParaRPr lang="pt-BR"/>
+          </a:p>
+        </p:txBody>
+      </p:sp>
+      <p:pic>
+        <p:nvPicPr>
+          <p:cNvPr id="6" name="Picture 8" descr="Java free icon">
+            <a:extLst>
+              <a:ext uri="{FF2B5EF4-FFF2-40B4-BE49-F238E27FC236}">
+                <a16:creationId xmlns:a16="http://schemas.microsoft.com/office/drawing/2014/main" id="{B13BC7E0-3882-4DD8-AF3C-3B0D994F16B8}"/>
+              </a:ext>
+            </a:extLst>
+          </p:cNvPr>
+          <p:cNvPicPr>
+            <a:picLocks noChangeAspect="1" noChangeArrowheads="1"/>
+          </p:cNvPicPr>
+          <p:nvPr/>
+        </p:nvPicPr>
+        <p:blipFill>
+          <a:blip r:embed="rId2">
+            <a:extLst>
+              <a:ext uri="{28A0092B-C50C-407E-A947-70E740481C1C}">
+                <a14:useLocalDpi xmlns:a14="http://schemas.microsoft.com/office/drawing/2010/main" val="0"/>
+              </a:ext>
+            </a:extLst>
+          </a:blip>
+          <a:srcRect/>
+          <a:stretch>
+            <a:fillRect/>
+          </a:stretch>
+        </p:blipFill>
+        <p:spPr bwMode="auto">
+          <a:xfrm>
+            <a:off x="1192224" y="3803738"/>
+            <a:ext cx="508598" cy="583137"/>
+          </a:xfrm>
+          <a:prstGeom prst="rect">
+            <a:avLst/>
+          </a:prstGeom>
+          <a:noFill/>
+          <a:extLst>
+            <a:ext uri="{909E8E84-426E-40DD-AFC4-6F175D3DCCD1}">
+              <a14:hiddenFill xmlns:a14="http://schemas.microsoft.com/office/drawing/2010/main">
+                <a:solidFill>
+                  <a:srgbClr val="FFFFFF"/>
+                </a:solidFill>
+              </a14:hiddenFill>
+            </a:ext>
+          </a:extLst>
+        </p:spPr>
+      </p:pic>
+      <p:sp>
+        <p:nvSpPr>
+          <p:cNvPr id="7" name="CaixaDeTexto 6">
+            <a:extLst>
+              <a:ext uri="{FF2B5EF4-FFF2-40B4-BE49-F238E27FC236}">
+                <a16:creationId xmlns:a16="http://schemas.microsoft.com/office/drawing/2014/main" id="{16FFA501-34A6-4D58-9BB1-0EA6F408B1F5}"/>
               </a:ext>
             </a:extLst>
           </p:cNvPr>
@@ -4775,8 +5015,8 @@
         </p:nvSpPr>
         <p:spPr>
           <a:xfrm>
-            <a:off x="954156" y="2822713"/>
-            <a:ext cx="10283687" cy="830997"/>
+            <a:off x="991708" y="4321266"/>
+            <a:ext cx="852783" cy="261610"/>
           </a:xfrm>
           <a:prstGeom prst="rect">
             <a:avLst/>
@@ -4791,21 +5031,904 @@
           <a:p>
             <a:pPr algn="ctr"/>
             <a:r>
-              <a:rPr lang="pt-BR" sz="4800" b="1" dirty="0">
+              <a:rPr lang="pt-BR" sz="1100" b="1" dirty="0"/>
+              <a:t>Java </a:t>
+            </a:r>
+            <a:r>
+              <a:rPr lang="pt-BR" sz="1100" b="1" dirty="0" err="1"/>
+              <a:t>cli</a:t>
+            </a:r>
+            <a:endParaRPr lang="pt-BR" sz="1100" b="1" dirty="0"/>
+          </a:p>
+        </p:txBody>
+      </p:sp>
+      <p:pic>
+        <p:nvPicPr>
+          <p:cNvPr id="8" name="Picture 2" descr="Sql server free icon">
+            <a:extLst>
+              <a:ext uri="{FF2B5EF4-FFF2-40B4-BE49-F238E27FC236}">
+                <a16:creationId xmlns:a16="http://schemas.microsoft.com/office/drawing/2014/main" id="{8D7F30D9-7E94-4C4A-8FEB-A6766556EAE5}"/>
+              </a:ext>
+            </a:extLst>
+          </p:cNvPr>
+          <p:cNvPicPr>
+            <a:picLocks noChangeAspect="1" noChangeArrowheads="1"/>
+          </p:cNvPicPr>
+          <p:nvPr/>
+        </p:nvPicPr>
+        <p:blipFill>
+          <a:blip r:embed="rId3">
+            <a:extLst>
+              <a:ext uri="{28A0092B-C50C-407E-A947-70E740481C1C}">
+                <a14:useLocalDpi xmlns:a14="http://schemas.microsoft.com/office/drawing/2010/main" val="0"/>
+              </a:ext>
+            </a:extLst>
+          </a:blip>
+          <a:srcRect/>
+          <a:stretch>
+            <a:fillRect/>
+          </a:stretch>
+        </p:blipFill>
+        <p:spPr bwMode="auto">
+          <a:xfrm>
+            <a:off x="8577568" y="1321369"/>
+            <a:ext cx="894094" cy="894094"/>
+          </a:xfrm>
+          <a:prstGeom prst="rect">
+            <a:avLst/>
+          </a:prstGeom>
+          <a:noFill/>
+          <a:extLst>
+            <a:ext uri="{909E8E84-426E-40DD-AFC4-6F175D3DCCD1}">
+              <a14:hiddenFill xmlns:a14="http://schemas.microsoft.com/office/drawing/2010/main">
                 <a:solidFill>
-                  <a:srgbClr val="FF0000"/>
+                  <a:srgbClr val="FFFFFF"/>
                 </a:solidFill>
+              </a14:hiddenFill>
+            </a:ext>
+          </a:extLst>
+        </p:spPr>
+      </p:pic>
+      <p:sp>
+        <p:nvSpPr>
+          <p:cNvPr id="9" name="Retângulo: Cantos Arredondados 8">
+            <a:extLst>
+              <a:ext uri="{FF2B5EF4-FFF2-40B4-BE49-F238E27FC236}">
+                <a16:creationId xmlns:a16="http://schemas.microsoft.com/office/drawing/2014/main" id="{70BF5BA4-F26D-4D31-847C-05AE22FE62B4}"/>
+              </a:ext>
+            </a:extLst>
+          </p:cNvPr>
+          <p:cNvSpPr/>
+          <p:nvPr/>
+        </p:nvSpPr>
+        <p:spPr>
+          <a:xfrm>
+            <a:off x="911842" y="3678996"/>
+            <a:ext cx="1033879" cy="903880"/>
+          </a:xfrm>
+          <a:prstGeom prst="roundRect">
+            <a:avLst>
+              <a:gd name="adj" fmla="val 0"/>
+            </a:avLst>
+          </a:prstGeom>
+          <a:noFill/>
+          <a:ln w="9525" cap="flat" cmpd="sng" algn="ctr">
+            <a:solidFill>
+              <a:schemeClr val="dk1"/>
+            </a:solidFill>
+            <a:prstDash val="solid"/>
+            <a:round/>
+            <a:headEnd type="none" w="med" len="med"/>
+            <a:tailEnd type="none" w="med" len="med"/>
+          </a:ln>
+          <a:effectLst>
+            <a:outerShdw blurRad="50800" dist="38100" dir="2700000" algn="tl" rotWithShape="0">
+              <a:prstClr val="black">
+                <a:alpha val="40000"/>
+              </a:prstClr>
+            </a:outerShdw>
+          </a:effectLst>
+        </p:spPr>
+        <p:style>
+          <a:lnRef idx="0">
+            <a:scrgbClr r="0" g="0" b="0"/>
+          </a:lnRef>
+          <a:fillRef idx="0">
+            <a:scrgbClr r="0" g="0" b="0"/>
+          </a:fillRef>
+          <a:effectRef idx="0">
+            <a:scrgbClr r="0" g="0" b="0"/>
+          </a:effectRef>
+          <a:fontRef idx="minor">
+            <a:schemeClr val="dk1"/>
+          </a:fontRef>
+        </p:style>
+        <p:txBody>
+          <a:bodyPr rtlCol="0" anchor="ctr"/>
+          <a:lstStyle/>
+          <a:p>
+            <a:pPr algn="ctr"/>
+            <a:endParaRPr lang="pt-BR"/>
+          </a:p>
+        </p:txBody>
+      </p:sp>
+      <p:cxnSp>
+        <p:nvCxnSpPr>
+          <p:cNvPr id="10" name="Conector: Curvo 9">
+            <a:extLst>
+              <a:ext uri="{FF2B5EF4-FFF2-40B4-BE49-F238E27FC236}">
+                <a16:creationId xmlns:a16="http://schemas.microsoft.com/office/drawing/2014/main" id="{90939313-028B-4EA6-8B6E-D369AAF6D2D5}"/>
+              </a:ext>
+            </a:extLst>
+          </p:cNvPr>
+          <p:cNvCxnSpPr>
+            <a:cxnSpLocks/>
+            <a:stCxn id="13" idx="3"/>
+            <a:endCxn id="8" idx="1"/>
+          </p:cNvCxnSpPr>
+          <p:nvPr/>
+        </p:nvCxnSpPr>
+        <p:spPr>
+          <a:xfrm>
+            <a:off x="4191982" y="1495665"/>
+            <a:ext cx="4385586" cy="272751"/>
+          </a:xfrm>
+          <a:prstGeom prst="curvedConnector3">
+            <a:avLst>
+              <a:gd name="adj1" fmla="val 50000"/>
+            </a:avLst>
+          </a:prstGeom>
+          <a:ln>
+            <a:headEnd type="triangle"/>
+            <a:tailEnd type="triangle"/>
+          </a:ln>
+          <a:effectLst>
+            <a:outerShdw blurRad="50800" dist="38100" dir="5400000" algn="t" rotWithShape="0">
+              <a:prstClr val="black">
+                <a:alpha val="40000"/>
+              </a:prstClr>
+            </a:outerShdw>
+          </a:effectLst>
+        </p:spPr>
+        <p:style>
+          <a:lnRef idx="1">
+            <a:schemeClr val="dk1"/>
+          </a:lnRef>
+          <a:fillRef idx="0">
+            <a:schemeClr val="dk1"/>
+          </a:fillRef>
+          <a:effectRef idx="0">
+            <a:schemeClr val="dk1"/>
+          </a:effectRef>
+          <a:fontRef idx="minor">
+            <a:schemeClr val="tx1"/>
+          </a:fontRef>
+        </p:style>
+      </p:cxnSp>
+      <p:pic>
+        <p:nvPicPr>
+          <p:cNvPr id="11" name="Picture 2" descr="Becomes CloudDev - เริ่มต้นใช้ AWS EC2 | by Thanaphoom Babparn | Medium">
+            <a:extLst>
+              <a:ext uri="{FF2B5EF4-FFF2-40B4-BE49-F238E27FC236}">
+                <a16:creationId xmlns:a16="http://schemas.microsoft.com/office/drawing/2014/main" id="{3F5ED28B-4511-4EAD-9600-FD6B04D67A70}"/>
+              </a:ext>
+            </a:extLst>
+          </p:cNvPr>
+          <p:cNvPicPr>
+            <a:picLocks noChangeAspect="1" noChangeArrowheads="1"/>
+          </p:cNvPicPr>
+          <p:nvPr/>
+        </p:nvPicPr>
+        <p:blipFill>
+          <a:blip r:embed="rId4">
+            <a:extLst>
+              <a:ext uri="{28A0092B-C50C-407E-A947-70E740481C1C}">
+                <a14:useLocalDpi xmlns:a14="http://schemas.microsoft.com/office/drawing/2010/main" val="0"/>
+              </a:ext>
+            </a:extLst>
+          </a:blip>
+          <a:srcRect/>
+          <a:stretch>
+            <a:fillRect/>
+          </a:stretch>
+        </p:blipFill>
+        <p:spPr bwMode="auto">
+          <a:xfrm>
+            <a:off x="3232009" y="1584938"/>
+            <a:ext cx="1241766" cy="1088615"/>
+          </a:xfrm>
+          <a:prstGeom prst="rect">
+            <a:avLst/>
+          </a:prstGeom>
+          <a:noFill/>
+          <a:extLst>
+            <a:ext uri="{909E8E84-426E-40DD-AFC4-6F175D3DCCD1}">
+              <a14:hiddenFill xmlns:a14="http://schemas.microsoft.com/office/drawing/2010/main">
+                <a:solidFill>
+                  <a:srgbClr val="FFFFFF"/>
+                </a:solidFill>
+              </a14:hiddenFill>
+            </a:ext>
+          </a:extLst>
+        </p:spPr>
+      </p:pic>
+      <p:sp>
+        <p:nvSpPr>
+          <p:cNvPr id="12" name="CaixaDeTexto 11">
+            <a:extLst>
+              <a:ext uri="{FF2B5EF4-FFF2-40B4-BE49-F238E27FC236}">
+                <a16:creationId xmlns:a16="http://schemas.microsoft.com/office/drawing/2014/main" id="{DBD70C9E-1C22-4C3A-AE4F-C280C1F0BD58}"/>
+              </a:ext>
+            </a:extLst>
+          </p:cNvPr>
+          <p:cNvSpPr txBox="1"/>
+          <p:nvPr/>
+        </p:nvSpPr>
+        <p:spPr>
+          <a:xfrm>
+            <a:off x="1290742" y="5375072"/>
+            <a:ext cx="1479892" cy="461665"/>
+          </a:xfrm>
+          <a:prstGeom prst="rect">
+            <a:avLst/>
+          </a:prstGeom>
+          <a:noFill/>
+        </p:spPr>
+        <p:txBody>
+          <a:bodyPr wrap="none" rtlCol="0">
+            <a:spAutoFit/>
+          </a:bodyPr>
+          <a:lstStyle/>
+          <a:p>
+            <a:r>
+              <a:rPr lang="pt-BR" sz="2400" dirty="0">
+                <a:latin typeface="Aharoni" panose="02010803020104030203" pitchFamily="2" charset="-79"/>
+                <a:cs typeface="Aharoni" panose="02010803020104030203" pitchFamily="2" charset="-79"/>
               </a:rPr>
-              <a:t>Contextualização</a:t>
-            </a:r>
-            <a:endParaRPr lang="pt-BR" b="1" dirty="0">
-              <a:solidFill>
-                <a:srgbClr val="FF0000"/>
-              </a:solidFill>
-            </a:endParaRPr>
-          </a:p>
-        </p:txBody>
-      </p:sp>
+              <a:t>Instância</a:t>
+            </a:r>
+          </a:p>
+        </p:txBody>
+      </p:sp>
+      <p:sp>
+        <p:nvSpPr>
+          <p:cNvPr id="13" name="CaixaDeTexto 12">
+            <a:extLst>
+              <a:ext uri="{FF2B5EF4-FFF2-40B4-BE49-F238E27FC236}">
+                <a16:creationId xmlns:a16="http://schemas.microsoft.com/office/drawing/2014/main" id="{8D124CA5-03C2-4C45-8E12-9365612CA80F}"/>
+              </a:ext>
+            </a:extLst>
+          </p:cNvPr>
+          <p:cNvSpPr txBox="1"/>
+          <p:nvPr/>
+        </p:nvSpPr>
+        <p:spPr>
+          <a:xfrm>
+            <a:off x="3547254" y="1264832"/>
+            <a:ext cx="644728" cy="461665"/>
+          </a:xfrm>
+          <a:prstGeom prst="rect">
+            <a:avLst/>
+          </a:prstGeom>
+          <a:noFill/>
+        </p:spPr>
+        <p:txBody>
+          <a:bodyPr wrap="none" rtlCol="0">
+            <a:spAutoFit/>
+          </a:bodyPr>
+          <a:lstStyle/>
+          <a:p>
+            <a:r>
+              <a:rPr lang="pt-BR" sz="2400" dirty="0">
+                <a:latin typeface="Aharoni" panose="02010803020104030203" pitchFamily="2" charset="-79"/>
+                <a:cs typeface="Aharoni" panose="02010803020104030203" pitchFamily="2" charset="-79"/>
+              </a:rPr>
+              <a:t>EC2</a:t>
+            </a:r>
+          </a:p>
+        </p:txBody>
+      </p:sp>
+      <p:sp>
+        <p:nvSpPr>
+          <p:cNvPr id="14" name="Retângulo: Cantos Arredondados 13">
+            <a:extLst>
+              <a:ext uri="{FF2B5EF4-FFF2-40B4-BE49-F238E27FC236}">
+                <a16:creationId xmlns:a16="http://schemas.microsoft.com/office/drawing/2014/main" id="{60348D19-B8F8-43E7-A16B-DA4CB30A5C56}"/>
+              </a:ext>
+            </a:extLst>
+          </p:cNvPr>
+          <p:cNvSpPr/>
+          <p:nvPr/>
+        </p:nvSpPr>
+        <p:spPr>
+          <a:xfrm>
+            <a:off x="8387462" y="4081288"/>
+            <a:ext cx="2685071" cy="2156516"/>
+          </a:xfrm>
+          <a:prstGeom prst="roundRect">
+            <a:avLst>
+              <a:gd name="adj" fmla="val 0"/>
+            </a:avLst>
+          </a:prstGeom>
+          <a:noFill/>
+          <a:ln w="9525" cap="flat" cmpd="sng" algn="ctr">
+            <a:solidFill>
+              <a:schemeClr val="dk1"/>
+            </a:solidFill>
+            <a:prstDash val="solid"/>
+            <a:round/>
+            <a:headEnd type="none" w="med" len="med"/>
+            <a:tailEnd type="none" w="med" len="med"/>
+          </a:ln>
+          <a:effectLst>
+            <a:outerShdw blurRad="50800" dist="38100" dir="2700000" algn="tl" rotWithShape="0">
+              <a:prstClr val="black">
+                <a:alpha val="40000"/>
+              </a:prstClr>
+            </a:outerShdw>
+          </a:effectLst>
+        </p:spPr>
+        <p:style>
+          <a:lnRef idx="0">
+            <a:scrgbClr r="0" g="0" b="0"/>
+          </a:lnRef>
+          <a:fillRef idx="0">
+            <a:scrgbClr r="0" g="0" b="0"/>
+          </a:fillRef>
+          <a:effectRef idx="0">
+            <a:scrgbClr r="0" g="0" b="0"/>
+          </a:effectRef>
+          <a:fontRef idx="minor">
+            <a:schemeClr val="dk1"/>
+          </a:fontRef>
+        </p:style>
+        <p:txBody>
+          <a:bodyPr rtlCol="0" anchor="ctr"/>
+          <a:lstStyle/>
+          <a:p>
+            <a:pPr algn="ctr"/>
+            <a:endParaRPr lang="pt-BR" dirty="0"/>
+          </a:p>
+        </p:txBody>
+      </p:sp>
+      <p:pic>
+        <p:nvPicPr>
+          <p:cNvPr id="15" name="Picture 8" descr="Java free icon">
+            <a:extLst>
+              <a:ext uri="{FF2B5EF4-FFF2-40B4-BE49-F238E27FC236}">
+                <a16:creationId xmlns:a16="http://schemas.microsoft.com/office/drawing/2014/main" id="{7E64D51D-6C78-4548-B2A2-C3FDA0836255}"/>
+              </a:ext>
+            </a:extLst>
+          </p:cNvPr>
+          <p:cNvPicPr>
+            <a:picLocks noChangeAspect="1" noChangeArrowheads="1"/>
+          </p:cNvPicPr>
+          <p:nvPr/>
+        </p:nvPicPr>
+        <p:blipFill>
+          <a:blip r:embed="rId2">
+            <a:extLst>
+              <a:ext uri="{28A0092B-C50C-407E-A947-70E740481C1C}">
+                <a14:useLocalDpi xmlns:a14="http://schemas.microsoft.com/office/drawing/2010/main" val="0"/>
+              </a:ext>
+            </a:extLst>
+          </a:blip>
+          <a:srcRect/>
+          <a:stretch>
+            <a:fillRect/>
+          </a:stretch>
+        </p:blipFill>
+        <p:spPr bwMode="auto">
+          <a:xfrm>
+            <a:off x="3100743" y="3189884"/>
+            <a:ext cx="508598" cy="462543"/>
+          </a:xfrm>
+          <a:prstGeom prst="rect">
+            <a:avLst/>
+          </a:prstGeom>
+          <a:noFill/>
+          <a:extLst>
+            <a:ext uri="{909E8E84-426E-40DD-AFC4-6F175D3DCCD1}">
+              <a14:hiddenFill xmlns:a14="http://schemas.microsoft.com/office/drawing/2010/main">
+                <a:solidFill>
+                  <a:srgbClr val="FFFFFF"/>
+                </a:solidFill>
+              </a14:hiddenFill>
+            </a:ext>
+          </a:extLst>
+        </p:spPr>
+      </p:pic>
+      <p:sp>
+        <p:nvSpPr>
+          <p:cNvPr id="16" name="CaixaDeTexto 15">
+            <a:extLst>
+              <a:ext uri="{FF2B5EF4-FFF2-40B4-BE49-F238E27FC236}">
+                <a16:creationId xmlns:a16="http://schemas.microsoft.com/office/drawing/2014/main" id="{B1D9E07B-AF37-4FD8-813D-80616CC4ED6B}"/>
+              </a:ext>
+            </a:extLst>
+          </p:cNvPr>
+          <p:cNvSpPr txBox="1"/>
+          <p:nvPr/>
+        </p:nvSpPr>
+        <p:spPr>
+          <a:xfrm>
+            <a:off x="2928650" y="3675984"/>
+            <a:ext cx="852783" cy="430887"/>
+          </a:xfrm>
+          <a:prstGeom prst="rect">
+            <a:avLst/>
+          </a:prstGeom>
+          <a:noFill/>
+        </p:spPr>
+        <p:txBody>
+          <a:bodyPr wrap="square" rtlCol="0">
+            <a:spAutoFit/>
+          </a:bodyPr>
+          <a:lstStyle/>
+          <a:p>
+            <a:pPr algn="ctr"/>
+            <a:r>
+              <a:rPr lang="pt-BR" sz="1100" b="1" dirty="0"/>
+              <a:t>Java assistente</a:t>
+            </a:r>
+          </a:p>
+        </p:txBody>
+      </p:sp>
+      <p:pic>
+        <p:nvPicPr>
+          <p:cNvPr id="17" name="Imagem 16">
+            <a:extLst>
+              <a:ext uri="{FF2B5EF4-FFF2-40B4-BE49-F238E27FC236}">
+                <a16:creationId xmlns:a16="http://schemas.microsoft.com/office/drawing/2014/main" id="{EFE35735-1096-4203-AF44-669E1CBC625D}"/>
+              </a:ext>
+            </a:extLst>
+          </p:cNvPr>
+          <p:cNvPicPr>
+            <a:picLocks noChangeAspect="1"/>
+          </p:cNvPicPr>
+          <p:nvPr/>
+        </p:nvPicPr>
+        <p:blipFill>
+          <a:blip r:embed="rId5"/>
+          <a:stretch>
+            <a:fillRect/>
+          </a:stretch>
+        </p:blipFill>
+        <p:spPr>
+          <a:xfrm>
+            <a:off x="7782848" y="3306124"/>
+            <a:ext cx="1209228" cy="1518908"/>
+          </a:xfrm>
+          <a:prstGeom prst="rect">
+            <a:avLst/>
+          </a:prstGeom>
+        </p:spPr>
+      </p:pic>
+      <p:sp>
+        <p:nvSpPr>
+          <p:cNvPr id="18" name="CaixaDeTexto 17">
+            <a:extLst>
+              <a:ext uri="{FF2B5EF4-FFF2-40B4-BE49-F238E27FC236}">
+                <a16:creationId xmlns:a16="http://schemas.microsoft.com/office/drawing/2014/main" id="{3C1B1FC0-46E5-4AED-8419-35E0E48F336B}"/>
+              </a:ext>
+            </a:extLst>
+          </p:cNvPr>
+          <p:cNvSpPr txBox="1"/>
+          <p:nvPr/>
+        </p:nvSpPr>
+        <p:spPr>
+          <a:xfrm>
+            <a:off x="9262923" y="6338733"/>
+            <a:ext cx="1066318" cy="461665"/>
+          </a:xfrm>
+          <a:prstGeom prst="rect">
+            <a:avLst/>
+          </a:prstGeom>
+          <a:noFill/>
+        </p:spPr>
+        <p:txBody>
+          <a:bodyPr wrap="none" rtlCol="0">
+            <a:spAutoFit/>
+          </a:bodyPr>
+          <a:lstStyle/>
+          <a:p>
+            <a:r>
+              <a:rPr lang="pt-BR" sz="2400" dirty="0">
+                <a:latin typeface="Aharoni" panose="02010803020104030203" pitchFamily="2" charset="-79"/>
+                <a:cs typeface="Aharoni" panose="02010803020104030203" pitchFamily="2" charset="-79"/>
+              </a:rPr>
+              <a:t>Totem</a:t>
+            </a:r>
+          </a:p>
+        </p:txBody>
+      </p:sp>
+      <p:pic>
+        <p:nvPicPr>
+          <p:cNvPr id="19" name="Picture 8" descr="Java free icon">
+            <a:extLst>
+              <a:ext uri="{FF2B5EF4-FFF2-40B4-BE49-F238E27FC236}">
+                <a16:creationId xmlns:a16="http://schemas.microsoft.com/office/drawing/2014/main" id="{EE422854-42EE-41B8-8963-4E2897E614A4}"/>
+              </a:ext>
+            </a:extLst>
+          </p:cNvPr>
+          <p:cNvPicPr>
+            <a:picLocks noChangeAspect="1" noChangeArrowheads="1"/>
+          </p:cNvPicPr>
+          <p:nvPr/>
+        </p:nvPicPr>
+        <p:blipFill>
+          <a:blip r:embed="rId2">
+            <a:extLst>
+              <a:ext uri="{28A0092B-C50C-407E-A947-70E740481C1C}">
+                <a14:useLocalDpi xmlns:a14="http://schemas.microsoft.com/office/drawing/2010/main" val="0"/>
+              </a:ext>
+            </a:extLst>
+          </a:blip>
+          <a:srcRect/>
+          <a:stretch>
+            <a:fillRect/>
+          </a:stretch>
+        </p:blipFill>
+        <p:spPr bwMode="auto">
+          <a:xfrm>
+            <a:off x="9471662" y="4582876"/>
+            <a:ext cx="648843" cy="590088"/>
+          </a:xfrm>
+          <a:prstGeom prst="rect">
+            <a:avLst/>
+          </a:prstGeom>
+          <a:noFill/>
+          <a:extLst>
+            <a:ext uri="{909E8E84-426E-40DD-AFC4-6F175D3DCCD1}">
+              <a14:hiddenFill xmlns:a14="http://schemas.microsoft.com/office/drawing/2010/main">
+                <a:solidFill>
+                  <a:srgbClr val="FFFFFF"/>
+                </a:solidFill>
+              </a14:hiddenFill>
+            </a:ext>
+          </a:extLst>
+        </p:spPr>
+      </p:pic>
+      <p:sp>
+        <p:nvSpPr>
+          <p:cNvPr id="20" name="CaixaDeTexto 19">
+            <a:extLst>
+              <a:ext uri="{FF2B5EF4-FFF2-40B4-BE49-F238E27FC236}">
+                <a16:creationId xmlns:a16="http://schemas.microsoft.com/office/drawing/2014/main" id="{2D9666DC-3599-48C2-97F5-5528D0302F74}"/>
+              </a:ext>
+            </a:extLst>
+          </p:cNvPr>
+          <p:cNvSpPr txBox="1"/>
+          <p:nvPr/>
+        </p:nvSpPr>
+        <p:spPr>
+          <a:xfrm>
+            <a:off x="9330956" y="5314409"/>
+            <a:ext cx="930253" cy="276999"/>
+          </a:xfrm>
+          <a:prstGeom prst="rect">
+            <a:avLst/>
+          </a:prstGeom>
+          <a:noFill/>
+        </p:spPr>
+        <p:txBody>
+          <a:bodyPr wrap="square" rtlCol="0">
+            <a:spAutoFit/>
+          </a:bodyPr>
+          <a:lstStyle/>
+          <a:p>
+            <a:pPr algn="ctr"/>
+            <a:r>
+              <a:rPr lang="pt-BR" sz="1200" b="1" dirty="0"/>
+              <a:t>API </a:t>
+            </a:r>
+            <a:r>
+              <a:rPr lang="pt-BR" sz="1200" b="1" dirty="0" err="1"/>
+              <a:t>looca</a:t>
+            </a:r>
+            <a:endParaRPr lang="pt-BR" sz="1200" b="1" dirty="0"/>
+          </a:p>
+        </p:txBody>
+      </p:sp>
+      <p:cxnSp>
+        <p:nvCxnSpPr>
+          <p:cNvPr id="21" name="Conector: Curvo 20">
+            <a:extLst>
+              <a:ext uri="{FF2B5EF4-FFF2-40B4-BE49-F238E27FC236}">
+                <a16:creationId xmlns:a16="http://schemas.microsoft.com/office/drawing/2014/main" id="{C4FECA8B-DC54-4C4B-B30D-5C50552732AC}"/>
+              </a:ext>
+            </a:extLst>
+          </p:cNvPr>
+          <p:cNvCxnSpPr>
+            <a:cxnSpLocks/>
+            <a:stCxn id="17" idx="1"/>
+            <a:endCxn id="11" idx="3"/>
+          </p:cNvCxnSpPr>
+          <p:nvPr/>
+        </p:nvCxnSpPr>
+        <p:spPr>
+          <a:xfrm rot="10800000">
+            <a:off x="4473776" y="2129246"/>
+            <a:ext cx="3309073" cy="1936332"/>
+          </a:xfrm>
+          <a:prstGeom prst="curvedConnector3">
+            <a:avLst>
+              <a:gd name="adj1" fmla="val 50000"/>
+            </a:avLst>
+          </a:prstGeom>
+          <a:ln>
+            <a:tailEnd type="triangle"/>
+          </a:ln>
+          <a:effectLst>
+            <a:outerShdw blurRad="50800" dist="38100" dir="2700000" algn="tl" rotWithShape="0">
+              <a:prstClr val="black">
+                <a:alpha val="40000"/>
+              </a:prstClr>
+            </a:outerShdw>
+          </a:effectLst>
+        </p:spPr>
+        <p:style>
+          <a:lnRef idx="1">
+            <a:schemeClr val="dk1"/>
+          </a:lnRef>
+          <a:fillRef idx="0">
+            <a:schemeClr val="dk1"/>
+          </a:fillRef>
+          <a:effectRef idx="0">
+            <a:schemeClr val="dk1"/>
+          </a:effectRef>
+          <a:fontRef idx="minor">
+            <a:schemeClr val="tx1"/>
+          </a:fontRef>
+        </p:style>
+      </p:cxnSp>
+      <p:sp>
+        <p:nvSpPr>
+          <p:cNvPr id="22" name="CaixaDeTexto 21">
+            <a:extLst>
+              <a:ext uri="{FF2B5EF4-FFF2-40B4-BE49-F238E27FC236}">
+                <a16:creationId xmlns:a16="http://schemas.microsoft.com/office/drawing/2014/main" id="{91F1C423-FBD4-463B-8734-400B309E900C}"/>
+              </a:ext>
+            </a:extLst>
+          </p:cNvPr>
+          <p:cNvSpPr txBox="1"/>
+          <p:nvPr/>
+        </p:nvSpPr>
+        <p:spPr>
+          <a:xfrm>
+            <a:off x="983787" y="4676276"/>
+            <a:ext cx="889987" cy="276999"/>
+          </a:xfrm>
+          <a:prstGeom prst="rect">
+            <a:avLst/>
+          </a:prstGeom>
+          <a:noFill/>
+        </p:spPr>
+        <p:txBody>
+          <a:bodyPr wrap="none" rtlCol="0">
+            <a:spAutoFit/>
+          </a:bodyPr>
+          <a:lstStyle/>
+          <a:p>
+            <a:r>
+              <a:rPr lang="pt-BR" sz="1200" dirty="0">
+                <a:latin typeface="Aharoni" panose="02010803020104030203" pitchFamily="2" charset="-79"/>
+                <a:cs typeface="Aharoni" panose="02010803020104030203" pitchFamily="2" charset="-79"/>
+              </a:rPr>
+              <a:t>Container</a:t>
+            </a:r>
+          </a:p>
+        </p:txBody>
+      </p:sp>
+      <p:cxnSp>
+        <p:nvCxnSpPr>
+          <p:cNvPr id="23" name="Conector: Curvo 22">
+            <a:extLst>
+              <a:ext uri="{FF2B5EF4-FFF2-40B4-BE49-F238E27FC236}">
+                <a16:creationId xmlns:a16="http://schemas.microsoft.com/office/drawing/2014/main" id="{28DD452F-33DF-486B-B003-0C68954AB1A1}"/>
+              </a:ext>
+            </a:extLst>
+          </p:cNvPr>
+          <p:cNvCxnSpPr>
+            <a:cxnSpLocks/>
+            <a:stCxn id="16" idx="1"/>
+            <a:endCxn id="9" idx="3"/>
+          </p:cNvCxnSpPr>
+          <p:nvPr/>
+        </p:nvCxnSpPr>
+        <p:spPr>
+          <a:xfrm rot="10800000" flipV="1">
+            <a:off x="1945722" y="3891428"/>
+            <a:ext cx="982929" cy="239508"/>
+          </a:xfrm>
+          <a:prstGeom prst="curvedConnector3">
+            <a:avLst>
+              <a:gd name="adj1" fmla="val 50000"/>
+            </a:avLst>
+          </a:prstGeom>
+          <a:ln>
+            <a:tailEnd type="triangle"/>
+          </a:ln>
+          <a:effectLst>
+            <a:outerShdw blurRad="50800" dist="38100" dir="2700000" algn="tl" rotWithShape="0">
+              <a:prstClr val="black">
+                <a:alpha val="40000"/>
+              </a:prstClr>
+            </a:outerShdw>
+          </a:effectLst>
+        </p:spPr>
+        <p:style>
+          <a:lnRef idx="1">
+            <a:schemeClr val="dk1"/>
+          </a:lnRef>
+          <a:fillRef idx="0">
+            <a:schemeClr val="dk1"/>
+          </a:fillRef>
+          <a:effectRef idx="0">
+            <a:schemeClr val="dk1"/>
+          </a:effectRef>
+          <a:fontRef idx="minor">
+            <a:schemeClr val="tx1"/>
+          </a:fontRef>
+        </p:style>
+      </p:cxnSp>
+      <p:pic>
+        <p:nvPicPr>
+          <p:cNvPr id="24" name="Picture 6" descr="Docker free icon">
+            <a:extLst>
+              <a:ext uri="{FF2B5EF4-FFF2-40B4-BE49-F238E27FC236}">
+                <a16:creationId xmlns:a16="http://schemas.microsoft.com/office/drawing/2014/main" id="{7B2801CC-B211-4D9A-AA48-8566BB4CC6CF}"/>
+              </a:ext>
+            </a:extLst>
+          </p:cNvPr>
+          <p:cNvPicPr>
+            <a:picLocks noChangeAspect="1" noChangeArrowheads="1"/>
+          </p:cNvPicPr>
+          <p:nvPr/>
+        </p:nvPicPr>
+        <p:blipFill>
+          <a:blip r:embed="rId6">
+            <a:extLst>
+              <a:ext uri="{28A0092B-C50C-407E-A947-70E740481C1C}">
+                <a14:useLocalDpi xmlns:a14="http://schemas.microsoft.com/office/drawing/2010/main" val="0"/>
+              </a:ext>
+            </a:extLst>
+          </a:blip>
+          <a:srcRect/>
+          <a:stretch>
+            <a:fillRect/>
+          </a:stretch>
+        </p:blipFill>
+        <p:spPr bwMode="auto">
+          <a:xfrm>
+            <a:off x="1655106" y="3169013"/>
+            <a:ext cx="754757" cy="754757"/>
+          </a:xfrm>
+          <a:prstGeom prst="rect">
+            <a:avLst/>
+          </a:prstGeom>
+          <a:noFill/>
+          <a:extLst>
+            <a:ext uri="{909E8E84-426E-40DD-AFC4-6F175D3DCCD1}">
+              <a14:hiddenFill xmlns:a14="http://schemas.microsoft.com/office/drawing/2010/main">
+                <a:solidFill>
+                  <a:srgbClr val="FFFFFF"/>
+                </a:solidFill>
+              </a14:hiddenFill>
+            </a:ext>
+          </a:extLst>
+        </p:spPr>
+      </p:pic>
+      <p:sp>
+        <p:nvSpPr>
+          <p:cNvPr id="26" name="CaixaDeTexto 25">
+            <a:extLst>
+              <a:ext uri="{FF2B5EF4-FFF2-40B4-BE49-F238E27FC236}">
+                <a16:creationId xmlns:a16="http://schemas.microsoft.com/office/drawing/2014/main" id="{6C242F02-D2C0-4D89-8448-6DAEAA51B723}"/>
+              </a:ext>
+            </a:extLst>
+          </p:cNvPr>
+          <p:cNvSpPr txBox="1"/>
+          <p:nvPr/>
+        </p:nvSpPr>
+        <p:spPr>
+          <a:xfrm>
+            <a:off x="1684197" y="2952637"/>
+            <a:ext cx="699230" cy="276999"/>
+          </a:xfrm>
+          <a:prstGeom prst="rect">
+            <a:avLst/>
+          </a:prstGeom>
+          <a:noFill/>
+        </p:spPr>
+        <p:txBody>
+          <a:bodyPr wrap="none" rtlCol="0">
+            <a:spAutoFit/>
+          </a:bodyPr>
+          <a:lstStyle/>
+          <a:p>
+            <a:r>
+              <a:rPr lang="pt-BR" sz="1200" dirty="0">
+                <a:latin typeface="Aharoni" panose="02010803020104030203" pitchFamily="2" charset="-79"/>
+                <a:cs typeface="Aharoni" panose="02010803020104030203" pitchFamily="2" charset="-79"/>
+              </a:rPr>
+              <a:t>Docker</a:t>
+            </a:r>
+          </a:p>
+        </p:txBody>
+      </p:sp>
+      <p:pic>
+        <p:nvPicPr>
+          <p:cNvPr id="27" name="Imagem 26" descr="Logotipo, nome da empresa&#10;&#10;Descrição gerada automaticamente">
+            <a:extLst>
+              <a:ext uri="{FF2B5EF4-FFF2-40B4-BE49-F238E27FC236}">
+                <a16:creationId xmlns:a16="http://schemas.microsoft.com/office/drawing/2014/main" id="{5BF0AE16-83C1-4577-B7E6-4A879D82AC83}"/>
+              </a:ext>
+            </a:extLst>
+          </p:cNvPr>
+          <p:cNvPicPr>
+            <a:picLocks noChangeAspect="1"/>
+          </p:cNvPicPr>
+          <p:nvPr/>
+        </p:nvPicPr>
+        <p:blipFill>
+          <a:blip r:embed="rId7">
+            <a:extLst>
+              <a:ext uri="{28A0092B-C50C-407E-A947-70E740481C1C}">
+                <a14:useLocalDpi xmlns:a14="http://schemas.microsoft.com/office/drawing/2010/main" val="0"/>
+              </a:ext>
+            </a:extLst>
+          </a:blip>
+          <a:stretch>
+            <a:fillRect/>
+          </a:stretch>
+        </p:blipFill>
+        <p:spPr>
+          <a:xfrm>
+            <a:off x="9568288" y="-412439"/>
+            <a:ext cx="2421900" cy="2421900"/>
+          </a:xfrm>
+          <a:prstGeom prst="rect">
+            <a:avLst/>
+          </a:prstGeom>
+        </p:spPr>
+      </p:pic>
+      <p:pic>
+        <p:nvPicPr>
+          <p:cNvPr id="28" name="Imagem 27" descr="Logotipo&#10;&#10;Descrição gerada automaticamente">
+            <a:extLst>
+              <a:ext uri="{FF2B5EF4-FFF2-40B4-BE49-F238E27FC236}">
+                <a16:creationId xmlns:a16="http://schemas.microsoft.com/office/drawing/2014/main" id="{ADA80AA6-9899-4926-8B99-6A2262863902}"/>
+              </a:ext>
+            </a:extLst>
+          </p:cNvPr>
+          <p:cNvPicPr>
+            <a:picLocks noChangeAspect="1"/>
+          </p:cNvPicPr>
+          <p:nvPr/>
+        </p:nvPicPr>
+        <p:blipFill>
+          <a:blip r:embed="rId8">
+            <a:extLst>
+              <a:ext uri="{28A0092B-C50C-407E-A947-70E740481C1C}">
+                <a14:useLocalDpi xmlns:a14="http://schemas.microsoft.com/office/drawing/2010/main" val="0"/>
+              </a:ext>
+            </a:extLst>
+          </a:blip>
+          <a:stretch>
+            <a:fillRect/>
+          </a:stretch>
+        </p:blipFill>
+        <p:spPr>
+          <a:xfrm>
+            <a:off x="91933" y="222168"/>
+            <a:ext cx="2200582" cy="1152686"/>
+          </a:xfrm>
+          <a:prstGeom prst="rect">
+            <a:avLst/>
+          </a:prstGeom>
+        </p:spPr>
+      </p:pic>
     </p:spTree>
     <p:extLst>
       <p:ext uri="{BB962C8B-B14F-4D97-AF65-F5344CB8AC3E}">

</xml_diff>